<commit_message>
PPTs Arq. de Comp. Yduqs 2022_2 - 27102022
</commit_message>
<xml_diff>
--- a/01 Classes/02- Arquiteturas_Comp1/Aula10 - Arquitetura.pptx
+++ b/01 Classes/02- Arquiteturas_Comp1/Aula10 - Arquitetura.pptx
@@ -17565,7 +17565,7 @@
               <a:buFont typeface="Noto Sans Symbols"/>
               <a:buNone/>
             </a:pPr>
-            <a:endParaRPr sz="2700" b="0" i="0" u="none" strike="noStrike" cap="none">
+            <a:endParaRPr sz="2700" b="0" i="0" u="none" strike="noStrike" cap="none" dirty="0">
               <a:solidFill>
                 <a:schemeClr val="dk2"/>
               </a:solidFill>
@@ -17594,7 +17594,7 @@
               <a:buNone/>
             </a:pPr>
             <a:r>
-              <a:rPr lang="pt-BR" sz="2000" b="1" i="0" u="none" strike="noStrike" cap="none">
+              <a:rPr lang="pt-BR" sz="2000" b="1" i="0" u="none" strike="noStrike" cap="none" dirty="0">
                 <a:solidFill>
                   <a:schemeClr val="dk2"/>
                 </a:solidFill>
@@ -17603,17 +17603,8 @@
                 <a:cs typeface="Calibri"/>
                 <a:sym typeface="Calibri"/>
               </a:rPr>
-              <a:t>Talita Rocha Pinheiro</a:t>
+              <a:t>Heleno Cardoso</a:t>
             </a:r>
-            <a:endParaRPr sz="3000" b="1" i="0" u="none" strike="noStrike" cap="none">
-              <a:solidFill>
-                <a:schemeClr val="dk2"/>
-              </a:solidFill>
-              <a:latin typeface="Calibri"/>
-              <a:ea typeface="Calibri"/>
-              <a:cs typeface="Calibri"/>
-              <a:sym typeface="Calibri"/>
-            </a:endParaRPr>
           </a:p>
         </p:txBody>
       </p:sp>
@@ -31863,7 +31854,7 @@
               <a:buFont typeface="Noto Sans Symbols"/>
               <a:buNone/>
             </a:pPr>
-            <a:endParaRPr sz="2700" b="0" i="0" u="none" strike="noStrike" cap="none">
+            <a:endParaRPr sz="2700" b="0" i="0" u="none" strike="noStrike" cap="none" dirty="0">
               <a:solidFill>
                 <a:schemeClr val="dk2"/>
               </a:solidFill>
@@ -31892,7 +31883,7 @@
               <a:buNone/>
             </a:pPr>
             <a:r>
-              <a:rPr lang="pt-BR" sz="2000" b="1" i="0" u="none" strike="noStrike" cap="none">
+              <a:rPr lang="pt-BR" sz="2000" b="1" i="0" u="none" strike="noStrike" cap="none" dirty="0">
                 <a:solidFill>
                   <a:schemeClr val="dk2"/>
                 </a:solidFill>
@@ -31901,9 +31892,29 @@
                 <a:cs typeface="Calibri"/>
                 <a:sym typeface="Calibri"/>
               </a:rPr>
-              <a:t>Talita Rocha Pinheiro</a:t>
+              <a:t>Heleno Cardoso</a:t>
             </a:r>
-            <a:endParaRPr sz="3000" b="1" i="0" u="none" strike="noStrike" cap="none">
+          </a:p>
+          <a:p>
+            <a:pPr algn="ctr">
+              <a:spcBef>
+                <a:spcPts val="400"/>
+              </a:spcBef>
+              <a:buSzPts val="2000"/>
+            </a:pPr>
+            <a:r>
+              <a:rPr lang="pt-BR" sz="2000" b="1" dirty="0">
+                <a:solidFill>
+                  <a:schemeClr val="dk2"/>
+                </a:solidFill>
+                <a:latin typeface="Calibri"/>
+                <a:ea typeface="Calibri"/>
+                <a:cs typeface="Calibri"/>
+                <a:sym typeface="Calibri"/>
+              </a:rPr>
+              <a:t>Créditos: Professora Talita Rocha Pinheiro</a:t>
+            </a:r>
+            <a:endParaRPr lang="pt-BR" sz="3000" b="1" i="0" u="none" strike="noStrike" cap="none" dirty="0">
               <a:solidFill>
                 <a:schemeClr val="dk2"/>
               </a:solidFill>

</xml_diff>